<commit_message>
updated the file for documentation
</commit_message>
<xml_diff>
--- a/Presentation/Presentation2.pptx
+++ b/Presentation/Presentation2.pptx
@@ -3214,7 +3214,7 @@
         </p:blipFill>
         <p:spPr>
           <a:xfrm>
-            <a:off x="770251" y="4648200"/>
+            <a:off x="609600" y="4648200"/>
             <a:ext cx="1682496" cy="1905000"/>
           </a:xfrm>
           <a:prstGeom prst="rect">
@@ -4387,15 +4387,7 @@
             <a:p>
               <a:r>
                 <a:rPr lang="en-US" sz="900" dirty="0" smtClean="0"/>
-                <a:t>Person to </a:t>
-              </a:r>
-              <a:r>
-                <a:rPr lang="en-US" sz="900" dirty="0" smtClean="0"/>
-                <a:t>Person </a:t>
-              </a:r>
-              <a:r>
-                <a:rPr lang="en-US" sz="900" dirty="0" smtClean="0"/>
-                <a:t>Reference</a:t>
+                <a:t>Person to Person Reference</a:t>
               </a:r>
               <a:endParaRPr lang="en-US" sz="900" dirty="0"/>
             </a:p>
@@ -4493,7 +4485,7 @@
         </p:nvGrpSpPr>
         <p:grpSpPr>
           <a:xfrm>
-            <a:off x="3124200" y="4724400"/>
+            <a:off x="2971800" y="4853538"/>
             <a:ext cx="1671516" cy="1775862"/>
             <a:chOff x="1051560" y="4853538"/>
             <a:chExt cx="1844040" cy="1852062"/>
@@ -4571,7 +4563,7 @@
         </p:nvGrpSpPr>
         <p:grpSpPr>
           <a:xfrm>
-            <a:off x="4572000" y="5257800"/>
+            <a:off x="4419600" y="5257800"/>
             <a:ext cx="1066800" cy="468016"/>
             <a:chOff x="4572000" y="5384884"/>
             <a:chExt cx="1066800" cy="468016"/>
@@ -4656,7 +4648,7 @@
         </p:nvGrpSpPr>
         <p:grpSpPr>
           <a:xfrm>
-            <a:off x="37338" y="4648200"/>
+            <a:off x="0" y="4648200"/>
             <a:ext cx="800100" cy="1828800"/>
             <a:chOff x="5825298" y="4800600"/>
             <a:chExt cx="800100" cy="1828800"/>
@@ -4730,91 +4722,6 @@
             <a:p>
               <a:pPr algn="ctr"/>
               <a:endParaRPr lang="en-US"/>
-            </a:p>
-          </p:txBody>
-        </p:sp>
-      </p:grpSp>
-      <p:grpSp>
-        <p:nvGrpSpPr>
-          <p:cNvPr id="109" name="Group 108"/>
-          <p:cNvGrpSpPr/>
-          <p:nvPr/>
-        </p:nvGrpSpPr>
-        <p:grpSpPr>
-          <a:xfrm>
-            <a:off x="2336220" y="5086290"/>
-            <a:ext cx="864180" cy="625625"/>
-            <a:chOff x="2564820" y="5205680"/>
-            <a:chExt cx="864180" cy="625625"/>
-          </a:xfrm>
-        </p:grpSpPr>
-        <p:sp>
-          <p:nvSpPr>
-            <p:cNvPr id="95" name="Down Arrow 94"/>
-            <p:cNvSpPr/>
-            <p:nvPr/>
-          </p:nvSpPr>
-          <p:spPr>
-            <a:xfrm rot="16200000">
-              <a:off x="2800329" y="5273478"/>
-              <a:ext cx="344905" cy="770750"/>
-            </a:xfrm>
-            <a:prstGeom prst="downArrow">
-              <a:avLst/>
-            </a:prstGeom>
-          </p:spPr>
-          <p:style>
-            <a:lnRef idx="2">
-              <a:schemeClr val="accent1">
-                <a:shade val="50000"/>
-              </a:schemeClr>
-            </a:lnRef>
-            <a:fillRef idx="1">
-              <a:schemeClr val="accent1"/>
-            </a:fillRef>
-            <a:effectRef idx="0">
-              <a:schemeClr val="accent1"/>
-            </a:effectRef>
-            <a:fontRef idx="minor">
-              <a:schemeClr val="lt1"/>
-            </a:fontRef>
-          </p:style>
-          <p:txBody>
-            <a:bodyPr rtlCol="0" anchor="ctr"/>
-            <a:lstStyle/>
-            <a:p>
-              <a:pPr algn="ctr"/>
-              <a:endParaRPr lang="en-US"/>
-            </a:p>
-          </p:txBody>
-        </p:sp>
-        <p:sp>
-          <p:nvSpPr>
-            <p:cNvPr id="102" name="TextBox 101"/>
-            <p:cNvSpPr txBox="1"/>
-            <p:nvPr/>
-          </p:nvSpPr>
-          <p:spPr>
-            <a:xfrm>
-              <a:off x="2564820" y="5205680"/>
-              <a:ext cx="864180" cy="400110"/>
-            </a:xfrm>
-            <a:prstGeom prst="rect">
-              <a:avLst/>
-            </a:prstGeom>
-            <a:noFill/>
-          </p:spPr>
-          <p:txBody>
-            <a:bodyPr wrap="square" rtlCol="0">
-              <a:spAutoFit/>
-            </a:bodyPr>
-            <a:lstStyle/>
-            <a:p>
-              <a:r>
-                <a:rPr lang="en-US" sz="1000" dirty="0" smtClean="0"/>
-                <a:t>Sends the invoice to</a:t>
-              </a:r>
-              <a:endParaRPr lang="en-US" sz="1000" dirty="0"/>
             </a:p>
           </p:txBody>
         </p:sp>
@@ -4901,7 +4808,7 @@
         </p:nvGrpSpPr>
         <p:grpSpPr>
           <a:xfrm>
-            <a:off x="1483808" y="6349893"/>
+            <a:off x="1371600" y="6349893"/>
             <a:ext cx="1030792" cy="529932"/>
             <a:chOff x="2949421" y="6385251"/>
             <a:chExt cx="1546379" cy="456117"/>
@@ -5173,7 +5080,7 @@
         </p:nvGrpSpPr>
         <p:grpSpPr>
           <a:xfrm>
-            <a:off x="5410200" y="4724400"/>
+            <a:off x="5410200" y="4779846"/>
             <a:ext cx="1600200" cy="1773354"/>
             <a:chOff x="880829" y="104001"/>
             <a:chExt cx="1227594" cy="1357183"/>
@@ -5321,6 +5228,91 @@
                 <a:t>Supplies</a:t>
               </a:r>
               <a:endParaRPr lang="en-US" sz="1100" dirty="0"/>
+            </a:p>
+          </p:txBody>
+        </p:sp>
+      </p:grpSp>
+      <p:grpSp>
+        <p:nvGrpSpPr>
+          <p:cNvPr id="9" name="Group 8"/>
+          <p:cNvGrpSpPr/>
+          <p:nvPr/>
+        </p:nvGrpSpPr>
+        <p:grpSpPr>
+          <a:xfrm>
+            <a:off x="2286000" y="4130045"/>
+            <a:ext cx="681094" cy="1813555"/>
+            <a:chOff x="2351666" y="4053844"/>
+            <a:chExt cx="681094" cy="1813555"/>
+          </a:xfrm>
+        </p:grpSpPr>
+        <p:sp>
+          <p:nvSpPr>
+            <p:cNvPr id="102" name="TextBox 101"/>
+            <p:cNvSpPr txBox="1"/>
+            <p:nvPr/>
+          </p:nvSpPr>
+          <p:spPr>
+            <a:xfrm rot="5400000">
+              <a:off x="1704060" y="4809149"/>
+              <a:ext cx="1716391" cy="400110"/>
+            </a:xfrm>
+            <a:prstGeom prst="rect">
+              <a:avLst/>
+            </a:prstGeom>
+            <a:noFill/>
+          </p:spPr>
+          <p:txBody>
+            <a:bodyPr wrap="square" rtlCol="0">
+              <a:spAutoFit/>
+            </a:bodyPr>
+            <a:lstStyle/>
+            <a:p>
+              <a:r>
+                <a:rPr lang="en-US" sz="1000" dirty="0" smtClean="0"/>
+                <a:t>Sends the invoice to</a:t>
+              </a:r>
+              <a:endParaRPr lang="en-US" sz="1000" dirty="0"/>
+            </a:p>
+          </p:txBody>
+        </p:sp>
+        <p:sp>
+          <p:nvSpPr>
+            <p:cNvPr id="7" name="Bent-Up Arrow 6"/>
+            <p:cNvSpPr/>
+            <p:nvPr/>
+          </p:nvSpPr>
+          <p:spPr>
+            <a:xfrm rot="5400000">
+              <a:off x="1812101" y="4593409"/>
+              <a:ext cx="1760223" cy="681094"/>
+            </a:xfrm>
+            <a:prstGeom prst="bentUpArrow">
+              <a:avLst/>
+            </a:prstGeom>
+          </p:spPr>
+          <p:style>
+            <a:lnRef idx="2">
+              <a:schemeClr val="accent1">
+                <a:shade val="50000"/>
+              </a:schemeClr>
+            </a:lnRef>
+            <a:fillRef idx="1">
+              <a:schemeClr val="accent1"/>
+            </a:fillRef>
+            <a:effectRef idx="0">
+              <a:schemeClr val="accent1"/>
+            </a:effectRef>
+            <a:fontRef idx="minor">
+              <a:schemeClr val="lt1"/>
+            </a:fontRef>
+          </p:style>
+          <p:txBody>
+            <a:bodyPr rtlCol="0" anchor="ctr"/>
+            <a:lstStyle/>
+            <a:p>
+              <a:pPr algn="ctr"/>
+              <a:endParaRPr lang="en-US"/>
             </a:p>
           </p:txBody>
         </p:sp>
@@ -6637,7 +6629,7 @@
                             </p:stCondLst>
                             <p:childTnLst>
                               <p:par>
-                                <p:cTn id="114" presetID="10" presetClass="entr" presetSubtype="0" fill="hold" nodeType="clickEffect">
+                                <p:cTn id="114" presetID="42" presetClass="entr" presetSubtype="0" fill="hold" nodeType="clickEffect">
                                   <p:stCondLst>
                                     <p:cond delay="750"/>
                                   </p:stCondLst>
@@ -6650,7 +6642,7 @@
                                           </p:stCondLst>
                                         </p:cTn>
                                         <p:tgtEl>
-                                          <p:spTgt spid="109"/>
+                                          <p:spTgt spid="9"/>
                                         </p:tgtEl>
                                         <p:attrNameLst>
                                           <p:attrName>style.visibility</p:attrName>
@@ -6664,10 +6656,56 @@
                                       <p:cBhvr>
                                         <p:cTn id="116" dur="2000"/>
                                         <p:tgtEl>
-                                          <p:spTgt spid="109"/>
+                                          <p:spTgt spid="9"/>
                                         </p:tgtEl>
                                       </p:cBhvr>
                                     </p:animEffect>
+                                    <p:anim calcmode="lin" valueType="num">
+                                      <p:cBhvr>
+                                        <p:cTn id="117" dur="2000" fill="hold"/>
+                                        <p:tgtEl>
+                                          <p:spTgt spid="9"/>
+                                        </p:tgtEl>
+                                        <p:attrNameLst>
+                                          <p:attrName>ppt_x</p:attrName>
+                                        </p:attrNameLst>
+                                      </p:cBhvr>
+                                      <p:tavLst>
+                                        <p:tav tm="0">
+                                          <p:val>
+                                            <p:strVal val="#ppt_x"/>
+                                          </p:val>
+                                        </p:tav>
+                                        <p:tav tm="100000">
+                                          <p:val>
+                                            <p:strVal val="#ppt_x"/>
+                                          </p:val>
+                                        </p:tav>
+                                      </p:tavLst>
+                                    </p:anim>
+                                    <p:anim calcmode="lin" valueType="num">
+                                      <p:cBhvr>
+                                        <p:cTn id="118" dur="2000" fill="hold"/>
+                                        <p:tgtEl>
+                                          <p:spTgt spid="9"/>
+                                        </p:tgtEl>
+                                        <p:attrNameLst>
+                                          <p:attrName>ppt_y</p:attrName>
+                                        </p:attrNameLst>
+                                      </p:cBhvr>
+                                      <p:tavLst>
+                                        <p:tav tm="0">
+                                          <p:val>
+                                            <p:strVal val="#ppt_y+.1"/>
+                                          </p:val>
+                                        </p:tav>
+                                        <p:tav tm="100000">
+                                          <p:val>
+                                            <p:strVal val="#ppt_y"/>
+                                          </p:val>
+                                        </p:tav>
+                                      </p:tavLst>
+                                    </p:anim>
                                   </p:childTnLst>
                                 </p:cTn>
                               </p:par>
@@ -6678,26 +6716,26 @@
                     </p:cTn>
                   </p:par>
                   <p:par>
-                    <p:cTn id="117" fill="hold">
+                    <p:cTn id="119" fill="hold">
                       <p:stCondLst>
                         <p:cond delay="indefinite"/>
                       </p:stCondLst>
                       <p:childTnLst>
                         <p:par>
-                          <p:cTn id="118" fill="hold">
+                          <p:cTn id="120" fill="hold">
                             <p:stCondLst>
                               <p:cond delay="0"/>
                             </p:stCondLst>
                             <p:childTnLst>
                               <p:par>
-                                <p:cTn id="119" presetID="6" presetClass="entr" presetSubtype="16" fill="hold" nodeType="clickEffect">
+                                <p:cTn id="121" presetID="6" presetClass="entr" presetSubtype="16" fill="hold" nodeType="clickEffect">
                                   <p:stCondLst>
                                     <p:cond delay="750"/>
                                   </p:stCondLst>
                                   <p:childTnLst>
                                     <p:set>
                                       <p:cBhvr>
-                                        <p:cTn id="120" dur="1" fill="hold">
+                                        <p:cTn id="122" dur="1" fill="hold">
                                           <p:stCondLst>
                                             <p:cond delay="0"/>
                                           </p:stCondLst>
@@ -6715,7 +6753,7 @@
                                     </p:set>
                                     <p:animEffect transition="in" filter="circle(in)">
                                       <p:cBhvr>
-                                        <p:cTn id="121" dur="2000"/>
+                                        <p:cTn id="123" dur="2000"/>
                                         <p:tgtEl>
                                           <p:spTgt spid="97"/>
                                         </p:tgtEl>
@@ -6731,26 +6769,26 @@
                     </p:cTn>
                   </p:par>
                   <p:par>
-                    <p:cTn id="122" fill="hold">
+                    <p:cTn id="124" fill="hold">
                       <p:stCondLst>
                         <p:cond delay="indefinite"/>
                       </p:stCondLst>
                       <p:childTnLst>
                         <p:par>
-                          <p:cTn id="123" fill="hold">
+                          <p:cTn id="125" fill="hold">
                             <p:stCondLst>
                               <p:cond delay="0"/>
                             </p:stCondLst>
                             <p:childTnLst>
                               <p:par>
-                                <p:cTn id="124" presetID="42" presetClass="entr" presetSubtype="0" fill="hold" nodeType="clickEffect">
+                                <p:cTn id="126" presetID="42" presetClass="entr" presetSubtype="0" fill="hold" nodeType="clickEffect">
                                   <p:stCondLst>
                                     <p:cond delay="750"/>
                                   </p:stCondLst>
                                   <p:childTnLst>
                                     <p:set>
                                       <p:cBhvr>
-                                        <p:cTn id="125" dur="1" fill="hold">
+                                        <p:cTn id="127" dur="1" fill="hold">
                                           <p:stCondLst>
                                             <p:cond delay="0"/>
                                           </p:stCondLst>
@@ -6768,7 +6806,7 @@
                                     </p:set>
                                     <p:animEffect transition="in" filter="fade">
                                       <p:cBhvr>
-                                        <p:cTn id="126" dur="2000"/>
+                                        <p:cTn id="128" dur="2000"/>
                                         <p:tgtEl>
                                           <p:spTgt spid="2"/>
                                         </p:tgtEl>
@@ -6776,7 +6814,7 @@
                                     </p:animEffect>
                                     <p:anim calcmode="lin" valueType="num">
                                       <p:cBhvr>
-                                        <p:cTn id="127" dur="2000" fill="hold"/>
+                                        <p:cTn id="129" dur="2000" fill="hold"/>
                                         <p:tgtEl>
                                           <p:spTgt spid="2"/>
                                         </p:tgtEl>
@@ -6799,7 +6837,7 @@
                                     </p:anim>
                                     <p:anim calcmode="lin" valueType="num">
                                       <p:cBhvr>
-                                        <p:cTn id="128" dur="2000" fill="hold"/>
+                                        <p:cTn id="130" dur="2000" fill="hold"/>
                                         <p:tgtEl>
                                           <p:spTgt spid="2"/>
                                         </p:tgtEl>
@@ -6830,26 +6868,26 @@
                     </p:cTn>
                   </p:par>
                   <p:par>
-                    <p:cTn id="129" fill="hold">
+                    <p:cTn id="131" fill="hold">
                       <p:stCondLst>
                         <p:cond delay="indefinite"/>
                       </p:stCondLst>
                       <p:childTnLst>
                         <p:par>
-                          <p:cTn id="130" fill="hold">
+                          <p:cTn id="132" fill="hold">
                             <p:stCondLst>
                               <p:cond delay="0"/>
                             </p:stCondLst>
                             <p:childTnLst>
                               <p:par>
-                                <p:cTn id="131" presetID="16" presetClass="entr" presetSubtype="21" fill="hold" nodeType="clickEffect">
+                                <p:cTn id="133" presetID="16" presetClass="entr" presetSubtype="21" fill="hold" nodeType="clickEffect">
                                   <p:stCondLst>
                                     <p:cond delay="0"/>
                                   </p:stCondLst>
                                   <p:childTnLst>
                                     <p:set>
                                       <p:cBhvr>
-                                        <p:cTn id="132" dur="1" fill="hold">
+                                        <p:cTn id="134" dur="1" fill="hold">
                                           <p:stCondLst>
                                             <p:cond delay="0"/>
                                           </p:stCondLst>
@@ -6867,7 +6905,7 @@
                                     </p:set>
                                     <p:animEffect transition="in" filter="barn(inVertical)">
                                       <p:cBhvr>
-                                        <p:cTn id="133" dur="2000"/>
+                                        <p:cTn id="135" dur="2000"/>
                                         <p:tgtEl>
                                           <p:spTgt spid="71"/>
                                         </p:tgtEl>
@@ -6883,26 +6921,26 @@
                     </p:cTn>
                   </p:par>
                   <p:par>
-                    <p:cTn id="134" fill="hold">
+                    <p:cTn id="136" fill="hold">
                       <p:stCondLst>
                         <p:cond delay="indefinite"/>
                       </p:stCondLst>
                       <p:childTnLst>
                         <p:par>
-                          <p:cTn id="135" fill="hold">
+                          <p:cTn id="137" fill="hold">
                             <p:stCondLst>
                               <p:cond delay="0"/>
                             </p:stCondLst>
                             <p:childTnLst>
                               <p:par>
-                                <p:cTn id="136" presetID="10" presetClass="entr" presetSubtype="0" fill="hold" nodeType="clickEffect">
+                                <p:cTn id="138" presetID="10" presetClass="entr" presetSubtype="0" fill="hold" nodeType="clickEffect">
                                   <p:stCondLst>
                                     <p:cond delay="0"/>
                                   </p:stCondLst>
                                   <p:childTnLst>
                                     <p:set>
                                       <p:cBhvr>
-                                        <p:cTn id="137" dur="1" fill="hold">
+                                        <p:cTn id="139" dur="1" fill="hold">
                                           <p:stCondLst>
                                             <p:cond delay="0"/>
                                           </p:stCondLst>
@@ -6920,7 +6958,7 @@
                                     </p:set>
                                     <p:animEffect transition="in" filter="fade">
                                       <p:cBhvr>
-                                        <p:cTn id="138" dur="500"/>
+                                        <p:cTn id="140" dur="500"/>
                                         <p:tgtEl>
                                           <p:spTgt spid="5"/>
                                         </p:tgtEl>
@@ -6936,26 +6974,26 @@
                     </p:cTn>
                   </p:par>
                   <p:par>
-                    <p:cTn id="139" fill="hold">
+                    <p:cTn id="141" fill="hold">
                       <p:stCondLst>
                         <p:cond delay="indefinite"/>
                       </p:stCondLst>
                       <p:childTnLst>
                         <p:par>
-                          <p:cTn id="140" fill="hold">
+                          <p:cTn id="142" fill="hold">
                             <p:stCondLst>
                               <p:cond delay="0"/>
                             </p:stCondLst>
                             <p:childTnLst>
                               <p:par>
-                                <p:cTn id="141" presetID="16" presetClass="entr" presetSubtype="21" fill="hold" nodeType="clickEffect">
+                                <p:cTn id="143" presetID="16" presetClass="entr" presetSubtype="21" fill="hold" nodeType="clickEffect">
                                   <p:stCondLst>
                                     <p:cond delay="750"/>
                                   </p:stCondLst>
                                   <p:childTnLst>
                                     <p:set>
                                       <p:cBhvr>
-                                        <p:cTn id="142" dur="1" fill="hold">
+                                        <p:cTn id="144" dur="1" fill="hold">
                                           <p:stCondLst>
                                             <p:cond delay="0"/>
                                           </p:stCondLst>
@@ -6973,7 +7011,7 @@
                                     </p:set>
                                     <p:animEffect transition="in" filter="barn(inVertical)">
                                       <p:cBhvr>
-                                        <p:cTn id="143" dur="2000"/>
+                                        <p:cTn id="145" dur="2000"/>
                                         <p:tgtEl>
                                           <p:spTgt spid="104"/>
                                         </p:tgtEl>

</xml_diff>